<commit_message>
Updated my story cards
</commit_message>
<xml_diff>
--- a/User Stories/Story Cards - Luke.pptx
+++ b/User Stories/Story Cards - Luke.pptx
@@ -11,9 +11,11 @@
     <p:sldId id="263" r:id="rId5"/>
     <p:sldId id="268" r:id="rId6"/>
     <p:sldId id="256" r:id="rId7"/>
-    <p:sldId id="265" r:id="rId8"/>
-    <p:sldId id="266" r:id="rId9"/>
-    <p:sldId id="267" r:id="rId10"/>
+    <p:sldId id="269" r:id="rId8"/>
+    <p:sldId id="270" r:id="rId9"/>
+    <p:sldId id="265" r:id="rId10"/>
+    <p:sldId id="266" r:id="rId11"/>
+    <p:sldId id="267" r:id="rId12"/>
   </p:sldIdLst>
   <p:sldSz cx="9906000" cy="6858000" type="A4"/>
   <p:notesSz cx="6858000" cy="9144000"/>
@@ -317,7 +319,7 @@
             <a:fld id="{1585DAA5-6BE2-467A-90B2-00E985D86198}" type="datetimeFigureOut">
               <a:rPr lang="en-AU" smtClean="0"/>
               <a:pPr/>
-              <a:t>3/08/2017</a:t>
+              <a:t>8/08/2017</a:t>
             </a:fld>
             <a:endParaRPr lang="en-AU"/>
           </a:p>
@@ -484,7 +486,7 @@
             <a:fld id="{1585DAA5-6BE2-467A-90B2-00E985D86198}" type="datetimeFigureOut">
               <a:rPr lang="en-AU" smtClean="0"/>
               <a:pPr/>
-              <a:t>3/08/2017</a:t>
+              <a:t>8/08/2017</a:t>
             </a:fld>
             <a:endParaRPr lang="en-AU"/>
           </a:p>
@@ -661,7 +663,7 @@
             <a:fld id="{1585DAA5-6BE2-467A-90B2-00E985D86198}" type="datetimeFigureOut">
               <a:rPr lang="en-AU" smtClean="0"/>
               <a:pPr/>
-              <a:t>3/08/2017</a:t>
+              <a:t>8/08/2017</a:t>
             </a:fld>
             <a:endParaRPr lang="en-AU"/>
           </a:p>
@@ -828,7 +830,7 @@
             <a:fld id="{1585DAA5-6BE2-467A-90B2-00E985D86198}" type="datetimeFigureOut">
               <a:rPr lang="en-AU" smtClean="0"/>
               <a:pPr/>
-              <a:t>3/08/2017</a:t>
+              <a:t>8/08/2017</a:t>
             </a:fld>
             <a:endParaRPr lang="en-AU"/>
           </a:p>
@@ -1071,7 +1073,7 @@
             <a:fld id="{1585DAA5-6BE2-467A-90B2-00E985D86198}" type="datetimeFigureOut">
               <a:rPr lang="en-AU" smtClean="0"/>
               <a:pPr/>
-              <a:t>3/08/2017</a:t>
+              <a:t>8/08/2017</a:t>
             </a:fld>
             <a:endParaRPr lang="en-AU"/>
           </a:p>
@@ -1356,7 +1358,7 @@
             <a:fld id="{1585DAA5-6BE2-467A-90B2-00E985D86198}" type="datetimeFigureOut">
               <a:rPr lang="en-AU" smtClean="0"/>
               <a:pPr/>
-              <a:t>3/08/2017</a:t>
+              <a:t>8/08/2017</a:t>
             </a:fld>
             <a:endParaRPr lang="en-AU"/>
           </a:p>
@@ -1775,7 +1777,7 @@
             <a:fld id="{1585DAA5-6BE2-467A-90B2-00E985D86198}" type="datetimeFigureOut">
               <a:rPr lang="en-AU" smtClean="0"/>
               <a:pPr/>
-              <a:t>3/08/2017</a:t>
+              <a:t>8/08/2017</a:t>
             </a:fld>
             <a:endParaRPr lang="en-AU"/>
           </a:p>
@@ -1890,7 +1892,7 @@
             <a:fld id="{1585DAA5-6BE2-467A-90B2-00E985D86198}" type="datetimeFigureOut">
               <a:rPr lang="en-AU" smtClean="0"/>
               <a:pPr/>
-              <a:t>3/08/2017</a:t>
+              <a:t>8/08/2017</a:t>
             </a:fld>
             <a:endParaRPr lang="en-AU"/>
           </a:p>
@@ -1982,7 +1984,7 @@
             <a:fld id="{1585DAA5-6BE2-467A-90B2-00E985D86198}" type="datetimeFigureOut">
               <a:rPr lang="en-AU" smtClean="0"/>
               <a:pPr/>
-              <a:t>3/08/2017</a:t>
+              <a:t>8/08/2017</a:t>
             </a:fld>
             <a:endParaRPr lang="en-AU"/>
           </a:p>
@@ -2256,7 +2258,7 @@
             <a:fld id="{1585DAA5-6BE2-467A-90B2-00E985D86198}" type="datetimeFigureOut">
               <a:rPr lang="en-AU" smtClean="0"/>
               <a:pPr/>
-              <a:t>3/08/2017</a:t>
+              <a:t>8/08/2017</a:t>
             </a:fld>
             <a:endParaRPr lang="en-AU"/>
           </a:p>
@@ -2506,7 +2508,7 @@
             <a:fld id="{1585DAA5-6BE2-467A-90B2-00E985D86198}" type="datetimeFigureOut">
               <a:rPr lang="en-AU" smtClean="0"/>
               <a:pPr/>
-              <a:t>3/08/2017</a:t>
+              <a:t>8/08/2017</a:t>
             </a:fld>
             <a:endParaRPr lang="en-AU"/>
           </a:p>
@@ -2716,7 +2718,7 @@
             <a:fld id="{1585DAA5-6BE2-467A-90B2-00E985D86198}" type="datetimeFigureOut">
               <a:rPr lang="en-AU" smtClean="0"/>
               <a:pPr/>
-              <a:t>3/08/2017</a:t>
+              <a:t>8/08/2017</a:t>
             </a:fld>
             <a:endParaRPr lang="en-AU"/>
           </a:p>
@@ -3138,7 +3140,7 @@
             </a:r>
             <a:r>
               <a:rPr lang="en-AU" sz="2000" dirty="0"/>
-              <a:t> – Exchange student</a:t>
+              <a:t> – University student</a:t>
             </a:r>
           </a:p>
           <a:p>
@@ -3186,12 +3188,32 @@
             </a:r>
             <a:r>
               <a:rPr lang="en-AU" sz="2000" dirty="0"/>
-              <a:t> </a:t>
-            </a:r>
-            <a:r>
-              <a:rPr lang="en-AU" sz="2000"/>
-              <a:t>– Admin</a:t>
-            </a:r>
+              <a:t> – Admin</a:t>
+            </a:r>
+          </a:p>
+          <a:p>
+            <a:pPr marL="0" indent="0">
+              <a:spcBef>
+                <a:spcPts val="900"/>
+              </a:spcBef>
+              <a:buNone/>
+            </a:pPr>
+            <a:r>
+              <a:rPr lang="en-AU" sz="2000" u="sng" dirty="0"/>
+              <a:t>Role 6 </a:t>
+            </a:r>
+            <a:r>
+              <a:rPr lang="en-AU" sz="2000" dirty="0"/>
+              <a:t>– Exchange student</a:t>
+            </a:r>
+          </a:p>
+          <a:p>
+            <a:pPr marL="0" indent="0">
+              <a:spcBef>
+                <a:spcPts val="900"/>
+              </a:spcBef>
+              <a:buNone/>
+            </a:pPr>
             <a:endParaRPr lang="en-AU" sz="2000" dirty="0"/>
           </a:p>
           <a:p>
@@ -3274,6 +3296,941 @@
         </p:txBody>
       </p:sp>
     </p:spTree>
+  </p:cSld>
+  <p:clrMapOvr>
+    <a:masterClrMapping/>
+  </p:clrMapOvr>
+</p:sld>
+</file>
+
+<file path=ppt/slides/slide10.xml><?xml version="1.0" encoding="utf-8"?>
+<p:sld xmlns:a="http://schemas.openxmlformats.org/drawingml/2006/main" xmlns:r="http://schemas.openxmlformats.org/officeDocument/2006/relationships" xmlns:p="http://schemas.openxmlformats.org/presentationml/2006/main">
+  <p:cSld>
+    <p:spTree>
+      <p:nvGrpSpPr>
+        <p:cNvPr id="1" name=""/>
+        <p:cNvGrpSpPr/>
+        <p:nvPr/>
+      </p:nvGrpSpPr>
+      <p:grpSpPr>
+        <a:xfrm>
+          <a:off x="0" y="0"/>
+          <a:ext cx="0" cy="0"/>
+          <a:chOff x="0" y="0"/>
+          <a:chExt cx="0" cy="0"/>
+        </a:xfrm>
+      </p:grpSpPr>
+      <p:sp>
+        <p:nvSpPr>
+          <p:cNvPr id="4" name="Rectangle 3"/>
+          <p:cNvSpPr/>
+          <p:nvPr/>
+        </p:nvSpPr>
+        <p:spPr>
+          <a:xfrm>
+            <a:off x="39153" y="109410"/>
+            <a:ext cx="720000" cy="540000"/>
+          </a:xfrm>
+          <a:prstGeom prst="rect">
+            <a:avLst/>
+          </a:prstGeom>
+          <a:solidFill>
+            <a:schemeClr val="accent1">
+              <a:lumMod val="40000"/>
+              <a:lumOff val="60000"/>
+            </a:schemeClr>
+          </a:solidFill>
+          <a:ln>
+            <a:solidFill>
+              <a:schemeClr val="accent1">
+                <a:lumMod val="50000"/>
+              </a:schemeClr>
+            </a:solidFill>
+          </a:ln>
+        </p:spPr>
+        <p:style>
+          <a:lnRef idx="2">
+            <a:schemeClr val="accent1">
+              <a:shade val="50000"/>
+            </a:schemeClr>
+          </a:lnRef>
+          <a:fillRef idx="1">
+            <a:schemeClr val="accent1"/>
+          </a:fillRef>
+          <a:effectRef idx="0">
+            <a:schemeClr val="accent1"/>
+          </a:effectRef>
+          <a:fontRef idx="minor">
+            <a:schemeClr val="lt1"/>
+          </a:fontRef>
+        </p:style>
+        <p:txBody>
+          <a:bodyPr wrap="square" lIns="0" rIns="0" rtlCol="0" anchor="ctr"/>
+          <a:lstStyle/>
+          <a:p>
+            <a:pPr algn="ctr"/>
+            <a:r>
+              <a:rPr lang="en-AU" sz="2000" dirty="0">
+                <a:solidFill>
+                  <a:schemeClr val="tx1"/>
+                </a:solidFill>
+              </a:rPr>
+              <a:t>Story ID 2 </a:t>
+            </a:r>
+          </a:p>
+        </p:txBody>
+      </p:sp>
+      <p:sp>
+        <p:nvSpPr>
+          <p:cNvPr id="6" name="Rectangle 5"/>
+          <p:cNvSpPr/>
+          <p:nvPr/>
+        </p:nvSpPr>
+        <p:spPr>
+          <a:xfrm>
+            <a:off x="831153" y="109410"/>
+            <a:ext cx="7380000" cy="540000"/>
+          </a:xfrm>
+          <a:prstGeom prst="rect">
+            <a:avLst/>
+          </a:prstGeom>
+          <a:ln>
+            <a:solidFill>
+              <a:schemeClr val="accent1">
+                <a:lumMod val="50000"/>
+              </a:schemeClr>
+            </a:solidFill>
+          </a:ln>
+        </p:spPr>
+        <p:style>
+          <a:lnRef idx="2">
+            <a:schemeClr val="accent1">
+              <a:shade val="50000"/>
+            </a:schemeClr>
+          </a:lnRef>
+          <a:fillRef idx="1">
+            <a:schemeClr val="accent1"/>
+          </a:fillRef>
+          <a:effectRef idx="0">
+            <a:schemeClr val="accent1"/>
+          </a:effectRef>
+          <a:fontRef idx="minor">
+            <a:schemeClr val="lt1"/>
+          </a:fontRef>
+        </p:style>
+        <p:txBody>
+          <a:bodyPr rtlCol="0" anchor="ctr"/>
+          <a:lstStyle/>
+          <a:p>
+            <a:pPr algn="ctr"/>
+            <a:r>
+              <a:rPr lang="en-AU" sz="2800" dirty="0"/>
+              <a:t>Story Title</a:t>
+            </a:r>
+          </a:p>
+        </p:txBody>
+      </p:sp>
+      <p:sp>
+        <p:nvSpPr>
+          <p:cNvPr id="7" name="Rectangle 6"/>
+          <p:cNvSpPr/>
+          <p:nvPr/>
+        </p:nvSpPr>
+        <p:spPr>
+          <a:xfrm>
+            <a:off x="39153" y="822470"/>
+            <a:ext cx="9828000" cy="2340000"/>
+          </a:xfrm>
+          <a:prstGeom prst="rect">
+            <a:avLst/>
+          </a:prstGeom>
+          <a:solidFill>
+            <a:schemeClr val="tx2">
+              <a:lumMod val="20000"/>
+              <a:lumOff val="80000"/>
+            </a:schemeClr>
+          </a:solidFill>
+          <a:ln>
+            <a:solidFill>
+              <a:schemeClr val="accent1">
+                <a:lumMod val="50000"/>
+              </a:schemeClr>
+            </a:solidFill>
+          </a:ln>
+        </p:spPr>
+        <p:style>
+          <a:lnRef idx="2">
+            <a:schemeClr val="accent1">
+              <a:shade val="50000"/>
+            </a:schemeClr>
+          </a:lnRef>
+          <a:fillRef idx="1">
+            <a:schemeClr val="accent1"/>
+          </a:fillRef>
+          <a:effectRef idx="0">
+            <a:schemeClr val="accent1"/>
+          </a:effectRef>
+          <a:fontRef idx="minor">
+            <a:schemeClr val="lt1"/>
+          </a:fontRef>
+        </p:style>
+        <p:txBody>
+          <a:bodyPr rtlCol="0" anchor="t" anchorCtr="0"/>
+          <a:lstStyle/>
+          <a:p>
+            <a:r>
+              <a:rPr lang="en-AU" sz="2400" dirty="0">
+                <a:solidFill>
+                  <a:schemeClr val="tx1"/>
+                </a:solidFill>
+              </a:rPr>
+              <a:t>As a tourist I want to know the hotels’ price, accommodation and facility so that I can compare to other hotels.</a:t>
+            </a:r>
+          </a:p>
+        </p:txBody>
+      </p:sp>
+      <p:sp>
+        <p:nvSpPr>
+          <p:cNvPr id="8" name="Rectangle 7"/>
+          <p:cNvSpPr/>
+          <p:nvPr/>
+        </p:nvSpPr>
+        <p:spPr>
+          <a:xfrm>
+            <a:off x="39153" y="3335530"/>
+            <a:ext cx="9828000" cy="1620000"/>
+          </a:xfrm>
+          <a:prstGeom prst="rect">
+            <a:avLst/>
+          </a:prstGeom>
+          <a:solidFill>
+            <a:schemeClr val="accent1">
+              <a:lumMod val="20000"/>
+              <a:lumOff val="80000"/>
+            </a:schemeClr>
+          </a:solidFill>
+          <a:ln>
+            <a:solidFill>
+              <a:schemeClr val="accent1">
+                <a:lumMod val="50000"/>
+              </a:schemeClr>
+            </a:solidFill>
+          </a:ln>
+        </p:spPr>
+        <p:style>
+          <a:lnRef idx="2">
+            <a:schemeClr val="accent1">
+              <a:shade val="50000"/>
+            </a:schemeClr>
+          </a:lnRef>
+          <a:fillRef idx="1">
+            <a:schemeClr val="accent1"/>
+          </a:fillRef>
+          <a:effectRef idx="0">
+            <a:schemeClr val="accent1"/>
+          </a:effectRef>
+          <a:fontRef idx="minor">
+            <a:schemeClr val="lt1"/>
+          </a:fontRef>
+        </p:style>
+        <p:txBody>
+          <a:bodyPr tIns="36000" rtlCol="0" anchor="t" anchorCtr="0"/>
+          <a:lstStyle/>
+          <a:p>
+            <a:r>
+              <a:rPr lang="en-AU" sz="2000" dirty="0">
+                <a:solidFill>
+                  <a:schemeClr val="tx1"/>
+                </a:solidFill>
+              </a:rPr>
+              <a:t>Acceptance Criteria</a:t>
+            </a:r>
+          </a:p>
+          <a:p>
+            <a:pPr marL="179388" indent="-179388">
+              <a:buFont typeface="Arial" pitchFamily="34" charset="0"/>
+              <a:buChar char="•"/>
+            </a:pPr>
+            <a:r>
+              <a:rPr lang="en-AU" sz="2000" dirty="0">
+                <a:solidFill>
+                  <a:schemeClr val="tx1"/>
+                </a:solidFill>
+              </a:rPr>
+              <a:t> The hotel page can sort the hotel list in price order, and has accommodation images and facility checkboxes under each hotel.</a:t>
+            </a:r>
+          </a:p>
+        </p:txBody>
+      </p:sp>
+      <p:sp>
+        <p:nvSpPr>
+          <p:cNvPr id="11" name="Rectangle 10"/>
+          <p:cNvSpPr/>
+          <p:nvPr/>
+        </p:nvSpPr>
+        <p:spPr>
+          <a:xfrm>
+            <a:off x="9147153" y="109410"/>
+            <a:ext cx="720000" cy="540000"/>
+          </a:xfrm>
+          <a:prstGeom prst="rect">
+            <a:avLst/>
+          </a:prstGeom>
+          <a:solidFill>
+            <a:srgbClr val="CCF0CD">
+              <a:alpha val="20000"/>
+            </a:srgbClr>
+          </a:solidFill>
+          <a:ln>
+            <a:solidFill>
+              <a:schemeClr val="accent1">
+                <a:lumMod val="50000"/>
+              </a:schemeClr>
+            </a:solidFill>
+          </a:ln>
+        </p:spPr>
+        <p:style>
+          <a:lnRef idx="2">
+            <a:schemeClr val="accent1">
+              <a:shade val="50000"/>
+            </a:schemeClr>
+          </a:lnRef>
+          <a:fillRef idx="1">
+            <a:schemeClr val="accent1"/>
+          </a:fillRef>
+          <a:effectRef idx="0">
+            <a:schemeClr val="accent1"/>
+          </a:effectRef>
+          <a:fontRef idx="minor">
+            <a:schemeClr val="lt1"/>
+          </a:fontRef>
+        </p:style>
+        <p:txBody>
+          <a:bodyPr wrap="square" lIns="0" rIns="0" rtlCol="0" anchor="ctr"/>
+          <a:lstStyle/>
+          <a:p>
+            <a:pPr algn="ctr"/>
+            <a:r>
+              <a:rPr lang="en-AU" sz="2000" dirty="0">
+                <a:solidFill>
+                  <a:schemeClr val="tx1"/>
+                </a:solidFill>
+              </a:rPr>
+              <a:t>Story Points</a:t>
+            </a:r>
+          </a:p>
+        </p:txBody>
+      </p:sp>
+      <p:sp>
+        <p:nvSpPr>
+          <p:cNvPr id="12" name="Rectangle 11"/>
+          <p:cNvSpPr/>
+          <p:nvPr/>
+        </p:nvSpPr>
+        <p:spPr>
+          <a:xfrm>
+            <a:off x="8283153" y="109410"/>
+            <a:ext cx="792000" cy="540000"/>
+          </a:xfrm>
+          <a:prstGeom prst="rect">
+            <a:avLst/>
+          </a:prstGeom>
+          <a:solidFill>
+            <a:schemeClr val="accent4">
+              <a:lumMod val="20000"/>
+              <a:lumOff val="80000"/>
+            </a:schemeClr>
+          </a:solidFill>
+          <a:ln>
+            <a:solidFill>
+              <a:schemeClr val="accent1">
+                <a:lumMod val="50000"/>
+              </a:schemeClr>
+            </a:solidFill>
+          </a:ln>
+        </p:spPr>
+        <p:style>
+          <a:lnRef idx="2">
+            <a:schemeClr val="accent1">
+              <a:shade val="50000"/>
+            </a:schemeClr>
+          </a:lnRef>
+          <a:fillRef idx="1">
+            <a:schemeClr val="accent1"/>
+          </a:fillRef>
+          <a:effectRef idx="0">
+            <a:schemeClr val="accent1"/>
+          </a:effectRef>
+          <a:fontRef idx="minor">
+            <a:schemeClr val="lt1"/>
+          </a:fontRef>
+        </p:style>
+        <p:txBody>
+          <a:bodyPr wrap="none" lIns="0" rIns="0" rtlCol="0" anchor="ctr"/>
+          <a:lstStyle/>
+          <a:p>
+            <a:pPr algn="ctr"/>
+            <a:r>
+              <a:rPr lang="en-AU" sz="2000" dirty="0">
+                <a:solidFill>
+                  <a:schemeClr val="tx1"/>
+                </a:solidFill>
+              </a:rPr>
+              <a:t>Priority</a:t>
+            </a:r>
+          </a:p>
+        </p:txBody>
+      </p:sp>
+      <p:sp>
+        <p:nvSpPr>
+          <p:cNvPr id="13" name="Rectangle 12"/>
+          <p:cNvSpPr/>
+          <p:nvPr/>
+        </p:nvSpPr>
+        <p:spPr>
+          <a:xfrm>
+            <a:off x="39153" y="5128590"/>
+            <a:ext cx="9828000" cy="1620000"/>
+          </a:xfrm>
+          <a:prstGeom prst="rect">
+            <a:avLst/>
+          </a:prstGeom>
+          <a:solidFill>
+            <a:schemeClr val="bg1"/>
+          </a:solidFill>
+          <a:ln>
+            <a:solidFill>
+              <a:schemeClr val="accent1">
+                <a:lumMod val="50000"/>
+              </a:schemeClr>
+            </a:solidFill>
+          </a:ln>
+        </p:spPr>
+        <p:style>
+          <a:lnRef idx="2">
+            <a:schemeClr val="accent1">
+              <a:shade val="50000"/>
+            </a:schemeClr>
+          </a:lnRef>
+          <a:fillRef idx="1">
+            <a:schemeClr val="accent1"/>
+          </a:fillRef>
+          <a:effectRef idx="0">
+            <a:schemeClr val="accent1"/>
+          </a:effectRef>
+          <a:fontRef idx="minor">
+            <a:schemeClr val="lt1"/>
+          </a:fontRef>
+        </p:style>
+        <p:txBody>
+          <a:bodyPr tIns="36000" rtlCol="0" anchor="t" anchorCtr="0"/>
+          <a:lstStyle/>
+          <a:p>
+            <a:r>
+              <a:rPr lang="en-AU" sz="2000" dirty="0">
+                <a:solidFill>
+                  <a:schemeClr val="tx1"/>
+                </a:solidFill>
+              </a:rPr>
+              <a:t>Notes</a:t>
+            </a:r>
+          </a:p>
+          <a:p>
+            <a:pPr marL="179388" indent="-179388">
+              <a:buFont typeface="Arial" pitchFamily="34" charset="0"/>
+              <a:buChar char="•"/>
+            </a:pPr>
+            <a:r>
+              <a:rPr lang="en-AU" sz="2000" dirty="0">
+                <a:solidFill>
+                  <a:schemeClr val="tx1"/>
+                </a:solidFill>
+              </a:rPr>
+              <a:t> </a:t>
+            </a:r>
+          </a:p>
+        </p:txBody>
+      </p:sp>
+    </p:spTree>
+    <p:extLst>
+      <p:ext uri="{BB962C8B-B14F-4D97-AF65-F5344CB8AC3E}">
+        <p14:creationId xmlns:p14="http://schemas.microsoft.com/office/powerpoint/2010/main" val="367885913"/>
+      </p:ext>
+    </p:extLst>
+  </p:cSld>
+  <p:clrMapOvr>
+    <a:masterClrMapping/>
+  </p:clrMapOvr>
+</p:sld>
+</file>
+
+<file path=ppt/slides/slide11.xml><?xml version="1.0" encoding="utf-8"?>
+<p:sld xmlns:a="http://schemas.openxmlformats.org/drawingml/2006/main" xmlns:r="http://schemas.openxmlformats.org/officeDocument/2006/relationships" xmlns:p="http://schemas.openxmlformats.org/presentationml/2006/main">
+  <p:cSld>
+    <p:spTree>
+      <p:nvGrpSpPr>
+        <p:cNvPr id="1" name=""/>
+        <p:cNvGrpSpPr/>
+        <p:nvPr/>
+      </p:nvGrpSpPr>
+      <p:grpSpPr>
+        <a:xfrm>
+          <a:off x="0" y="0"/>
+          <a:ext cx="0" cy="0"/>
+          <a:chOff x="0" y="0"/>
+          <a:chExt cx="0" cy="0"/>
+        </a:xfrm>
+      </p:grpSpPr>
+      <p:sp>
+        <p:nvSpPr>
+          <p:cNvPr id="4" name="Rectangle 3"/>
+          <p:cNvSpPr/>
+          <p:nvPr/>
+        </p:nvSpPr>
+        <p:spPr>
+          <a:xfrm>
+            <a:off x="39153" y="109410"/>
+            <a:ext cx="720000" cy="540000"/>
+          </a:xfrm>
+          <a:prstGeom prst="rect">
+            <a:avLst/>
+          </a:prstGeom>
+          <a:solidFill>
+            <a:schemeClr val="accent1">
+              <a:lumMod val="40000"/>
+              <a:lumOff val="60000"/>
+            </a:schemeClr>
+          </a:solidFill>
+          <a:ln>
+            <a:solidFill>
+              <a:schemeClr val="accent1">
+                <a:lumMod val="50000"/>
+              </a:schemeClr>
+            </a:solidFill>
+          </a:ln>
+        </p:spPr>
+        <p:style>
+          <a:lnRef idx="2">
+            <a:schemeClr val="accent1">
+              <a:shade val="50000"/>
+            </a:schemeClr>
+          </a:lnRef>
+          <a:fillRef idx="1">
+            <a:schemeClr val="accent1"/>
+          </a:fillRef>
+          <a:effectRef idx="0">
+            <a:schemeClr val="accent1"/>
+          </a:effectRef>
+          <a:fontRef idx="minor">
+            <a:schemeClr val="lt1"/>
+          </a:fontRef>
+        </p:style>
+        <p:txBody>
+          <a:bodyPr wrap="square" lIns="0" rIns="0" rtlCol="0" anchor="ctr"/>
+          <a:lstStyle/>
+          <a:p>
+            <a:pPr algn="ctr"/>
+            <a:r>
+              <a:rPr lang="en-AU" sz="2000" dirty="0">
+                <a:solidFill>
+                  <a:schemeClr val="tx1"/>
+                </a:solidFill>
+              </a:rPr>
+              <a:t>Story ID 3</a:t>
+            </a:r>
+          </a:p>
+        </p:txBody>
+      </p:sp>
+      <p:sp>
+        <p:nvSpPr>
+          <p:cNvPr id="6" name="Rectangle 5"/>
+          <p:cNvSpPr/>
+          <p:nvPr/>
+        </p:nvSpPr>
+        <p:spPr>
+          <a:xfrm>
+            <a:off x="831153" y="109410"/>
+            <a:ext cx="7380000" cy="540000"/>
+          </a:xfrm>
+          <a:prstGeom prst="rect">
+            <a:avLst/>
+          </a:prstGeom>
+          <a:ln>
+            <a:solidFill>
+              <a:schemeClr val="accent1">
+                <a:lumMod val="50000"/>
+              </a:schemeClr>
+            </a:solidFill>
+          </a:ln>
+        </p:spPr>
+        <p:style>
+          <a:lnRef idx="2">
+            <a:schemeClr val="accent1">
+              <a:shade val="50000"/>
+            </a:schemeClr>
+          </a:lnRef>
+          <a:fillRef idx="1">
+            <a:schemeClr val="accent1"/>
+          </a:fillRef>
+          <a:effectRef idx="0">
+            <a:schemeClr val="accent1"/>
+          </a:effectRef>
+          <a:fontRef idx="minor">
+            <a:schemeClr val="lt1"/>
+          </a:fontRef>
+        </p:style>
+        <p:txBody>
+          <a:bodyPr rtlCol="0" anchor="ctr"/>
+          <a:lstStyle/>
+          <a:p>
+            <a:pPr algn="ctr"/>
+            <a:r>
+              <a:rPr lang="en-AU" sz="2800" dirty="0"/>
+              <a:t>Story Title</a:t>
+            </a:r>
+          </a:p>
+        </p:txBody>
+      </p:sp>
+      <p:sp>
+        <p:nvSpPr>
+          <p:cNvPr id="7" name="Rectangle 6"/>
+          <p:cNvSpPr/>
+          <p:nvPr/>
+        </p:nvSpPr>
+        <p:spPr>
+          <a:xfrm>
+            <a:off x="39153" y="822470"/>
+            <a:ext cx="9828000" cy="2340000"/>
+          </a:xfrm>
+          <a:prstGeom prst="rect">
+            <a:avLst/>
+          </a:prstGeom>
+          <a:solidFill>
+            <a:schemeClr val="tx2">
+              <a:lumMod val="20000"/>
+              <a:lumOff val="80000"/>
+            </a:schemeClr>
+          </a:solidFill>
+          <a:ln>
+            <a:solidFill>
+              <a:schemeClr val="accent1">
+                <a:lumMod val="50000"/>
+              </a:schemeClr>
+            </a:solidFill>
+          </a:ln>
+        </p:spPr>
+        <p:style>
+          <a:lnRef idx="2">
+            <a:schemeClr val="accent1">
+              <a:shade val="50000"/>
+            </a:schemeClr>
+          </a:lnRef>
+          <a:fillRef idx="1">
+            <a:schemeClr val="accent1"/>
+          </a:fillRef>
+          <a:effectRef idx="0">
+            <a:schemeClr val="accent1"/>
+          </a:effectRef>
+          <a:fontRef idx="minor">
+            <a:schemeClr val="lt1"/>
+          </a:fontRef>
+        </p:style>
+        <p:txBody>
+          <a:bodyPr rtlCol="0" anchor="t" anchorCtr="0"/>
+          <a:lstStyle/>
+          <a:p>
+            <a:r>
+              <a:rPr lang="en-AU" sz="2400" dirty="0">
+                <a:solidFill>
+                  <a:schemeClr val="tx1"/>
+                </a:solidFill>
+              </a:rPr>
+              <a:t>As a businessman I want to know what industries and companies there are in the city so that I can decide on who to contact and sell my products.</a:t>
+            </a:r>
+          </a:p>
+        </p:txBody>
+      </p:sp>
+      <p:sp>
+        <p:nvSpPr>
+          <p:cNvPr id="8" name="Rectangle 7"/>
+          <p:cNvSpPr/>
+          <p:nvPr/>
+        </p:nvSpPr>
+        <p:spPr>
+          <a:xfrm>
+            <a:off x="39153" y="3335530"/>
+            <a:ext cx="9828000" cy="1620000"/>
+          </a:xfrm>
+          <a:prstGeom prst="rect">
+            <a:avLst/>
+          </a:prstGeom>
+          <a:solidFill>
+            <a:schemeClr val="accent1">
+              <a:lumMod val="20000"/>
+              <a:lumOff val="80000"/>
+            </a:schemeClr>
+          </a:solidFill>
+          <a:ln>
+            <a:solidFill>
+              <a:schemeClr val="accent1">
+                <a:lumMod val="50000"/>
+              </a:schemeClr>
+            </a:solidFill>
+          </a:ln>
+        </p:spPr>
+        <p:style>
+          <a:lnRef idx="2">
+            <a:schemeClr val="accent1">
+              <a:shade val="50000"/>
+            </a:schemeClr>
+          </a:lnRef>
+          <a:fillRef idx="1">
+            <a:schemeClr val="accent1"/>
+          </a:fillRef>
+          <a:effectRef idx="0">
+            <a:schemeClr val="accent1"/>
+          </a:effectRef>
+          <a:fontRef idx="minor">
+            <a:schemeClr val="lt1"/>
+          </a:fontRef>
+        </p:style>
+        <p:txBody>
+          <a:bodyPr tIns="36000" rtlCol="0" anchor="t" anchorCtr="0"/>
+          <a:lstStyle/>
+          <a:p>
+            <a:r>
+              <a:rPr lang="en-AU" sz="2000" dirty="0">
+                <a:solidFill>
+                  <a:schemeClr val="tx1"/>
+                </a:solidFill>
+              </a:rPr>
+              <a:t>Acceptance Criteria</a:t>
+            </a:r>
+          </a:p>
+          <a:p>
+            <a:pPr marL="179388" indent="-179388">
+              <a:buFont typeface="Arial" pitchFamily="34" charset="0"/>
+              <a:buChar char="•"/>
+            </a:pPr>
+            <a:r>
+              <a:rPr lang="en-AU" sz="2000" dirty="0">
+                <a:solidFill>
+                  <a:schemeClr val="tx1"/>
+                </a:solidFill>
+              </a:rPr>
+              <a:t> The industries page has a combo box to choose the category of industries </a:t>
+            </a:r>
+            <a:r>
+              <a:rPr lang="en-AU" sz="2000">
+                <a:solidFill>
+                  <a:schemeClr val="tx1"/>
+                </a:solidFill>
+              </a:rPr>
+              <a:t>to display. </a:t>
+            </a:r>
+            <a:endParaRPr lang="en-AU" sz="2000" dirty="0">
+              <a:solidFill>
+                <a:schemeClr val="tx1"/>
+              </a:solidFill>
+            </a:endParaRPr>
+          </a:p>
+        </p:txBody>
+      </p:sp>
+      <p:sp>
+        <p:nvSpPr>
+          <p:cNvPr id="11" name="Rectangle 10"/>
+          <p:cNvSpPr/>
+          <p:nvPr/>
+        </p:nvSpPr>
+        <p:spPr>
+          <a:xfrm>
+            <a:off x="9147153" y="109410"/>
+            <a:ext cx="720000" cy="540000"/>
+          </a:xfrm>
+          <a:prstGeom prst="rect">
+            <a:avLst/>
+          </a:prstGeom>
+          <a:solidFill>
+            <a:srgbClr val="CCF0CD">
+              <a:alpha val="20000"/>
+            </a:srgbClr>
+          </a:solidFill>
+          <a:ln>
+            <a:solidFill>
+              <a:schemeClr val="accent1">
+                <a:lumMod val="50000"/>
+              </a:schemeClr>
+            </a:solidFill>
+          </a:ln>
+        </p:spPr>
+        <p:style>
+          <a:lnRef idx="2">
+            <a:schemeClr val="accent1">
+              <a:shade val="50000"/>
+            </a:schemeClr>
+          </a:lnRef>
+          <a:fillRef idx="1">
+            <a:schemeClr val="accent1"/>
+          </a:fillRef>
+          <a:effectRef idx="0">
+            <a:schemeClr val="accent1"/>
+          </a:effectRef>
+          <a:fontRef idx="minor">
+            <a:schemeClr val="lt1"/>
+          </a:fontRef>
+        </p:style>
+        <p:txBody>
+          <a:bodyPr wrap="square" lIns="0" rIns="0" rtlCol="0" anchor="ctr"/>
+          <a:lstStyle/>
+          <a:p>
+            <a:pPr algn="ctr"/>
+            <a:r>
+              <a:rPr lang="en-AU" sz="2000" dirty="0">
+                <a:solidFill>
+                  <a:schemeClr val="tx1"/>
+                </a:solidFill>
+              </a:rPr>
+              <a:t>Story Points</a:t>
+            </a:r>
+          </a:p>
+        </p:txBody>
+      </p:sp>
+      <p:sp>
+        <p:nvSpPr>
+          <p:cNvPr id="12" name="Rectangle 11"/>
+          <p:cNvSpPr/>
+          <p:nvPr/>
+        </p:nvSpPr>
+        <p:spPr>
+          <a:xfrm>
+            <a:off x="8283153" y="109410"/>
+            <a:ext cx="792000" cy="540000"/>
+          </a:xfrm>
+          <a:prstGeom prst="rect">
+            <a:avLst/>
+          </a:prstGeom>
+          <a:solidFill>
+            <a:schemeClr val="accent4">
+              <a:lumMod val="20000"/>
+              <a:lumOff val="80000"/>
+            </a:schemeClr>
+          </a:solidFill>
+          <a:ln>
+            <a:solidFill>
+              <a:schemeClr val="accent1">
+                <a:lumMod val="50000"/>
+              </a:schemeClr>
+            </a:solidFill>
+          </a:ln>
+        </p:spPr>
+        <p:style>
+          <a:lnRef idx="2">
+            <a:schemeClr val="accent1">
+              <a:shade val="50000"/>
+            </a:schemeClr>
+          </a:lnRef>
+          <a:fillRef idx="1">
+            <a:schemeClr val="accent1"/>
+          </a:fillRef>
+          <a:effectRef idx="0">
+            <a:schemeClr val="accent1"/>
+          </a:effectRef>
+          <a:fontRef idx="minor">
+            <a:schemeClr val="lt1"/>
+          </a:fontRef>
+        </p:style>
+        <p:txBody>
+          <a:bodyPr wrap="none" lIns="0" rIns="0" rtlCol="0" anchor="ctr"/>
+          <a:lstStyle/>
+          <a:p>
+            <a:pPr algn="ctr"/>
+            <a:r>
+              <a:rPr lang="en-AU" sz="2000" dirty="0">
+                <a:solidFill>
+                  <a:schemeClr val="tx1"/>
+                </a:solidFill>
+              </a:rPr>
+              <a:t>Priority</a:t>
+            </a:r>
+          </a:p>
+        </p:txBody>
+      </p:sp>
+      <p:sp>
+        <p:nvSpPr>
+          <p:cNvPr id="13" name="Rectangle 12"/>
+          <p:cNvSpPr/>
+          <p:nvPr/>
+        </p:nvSpPr>
+        <p:spPr>
+          <a:xfrm>
+            <a:off x="39153" y="5128590"/>
+            <a:ext cx="9828000" cy="1620000"/>
+          </a:xfrm>
+          <a:prstGeom prst="rect">
+            <a:avLst/>
+          </a:prstGeom>
+          <a:solidFill>
+            <a:schemeClr val="bg1"/>
+          </a:solidFill>
+          <a:ln>
+            <a:solidFill>
+              <a:schemeClr val="accent1">
+                <a:lumMod val="50000"/>
+              </a:schemeClr>
+            </a:solidFill>
+          </a:ln>
+        </p:spPr>
+        <p:style>
+          <a:lnRef idx="2">
+            <a:schemeClr val="accent1">
+              <a:shade val="50000"/>
+            </a:schemeClr>
+          </a:lnRef>
+          <a:fillRef idx="1">
+            <a:schemeClr val="accent1"/>
+          </a:fillRef>
+          <a:effectRef idx="0">
+            <a:schemeClr val="accent1"/>
+          </a:effectRef>
+          <a:fontRef idx="minor">
+            <a:schemeClr val="lt1"/>
+          </a:fontRef>
+        </p:style>
+        <p:txBody>
+          <a:bodyPr tIns="36000" rtlCol="0" anchor="t" anchorCtr="0"/>
+          <a:lstStyle/>
+          <a:p>
+            <a:r>
+              <a:rPr lang="en-AU" sz="2000" dirty="0">
+                <a:solidFill>
+                  <a:schemeClr val="tx1"/>
+                </a:solidFill>
+              </a:rPr>
+              <a:t>Notes</a:t>
+            </a:r>
+          </a:p>
+          <a:p>
+            <a:pPr marL="179388" indent="-179388">
+              <a:buFont typeface="Arial" pitchFamily="34" charset="0"/>
+              <a:buChar char="•"/>
+            </a:pPr>
+            <a:r>
+              <a:rPr lang="en-AU" sz="2000" dirty="0">
+                <a:solidFill>
+                  <a:schemeClr val="tx1"/>
+                </a:solidFill>
+              </a:rPr>
+              <a:t> </a:t>
+            </a:r>
+          </a:p>
+        </p:txBody>
+      </p:sp>
+    </p:spTree>
+    <p:extLst>
+      <p:ext uri="{BB962C8B-B14F-4D97-AF65-F5344CB8AC3E}">
+        <p14:creationId xmlns:p14="http://schemas.microsoft.com/office/powerpoint/2010/main" val="4032204815"/>
+      </p:ext>
+    </p:extLst>
   </p:cSld>
   <p:clrMapOvr>
     <a:masterClrMapping/>
@@ -3651,7 +4608,7 @@
                   <a:schemeClr val="tx1"/>
                 </a:solidFill>
               </a:rPr>
-              <a:t>Priority</a:t>
+              <a:t>M</a:t>
             </a:r>
           </a:p>
         </p:txBody>
@@ -4109,7 +5066,7 @@
                   <a:schemeClr val="tx1"/>
                 </a:solidFill>
               </a:rPr>
-              <a:t>Priority</a:t>
+              <a:t>M</a:t>
             </a:r>
           </a:p>
         </p:txBody>
@@ -4451,7 +5408,7 @@
                   <a:schemeClr val="tx1"/>
                 </a:solidFill>
               </a:rPr>
-              <a:t>Display the main menu with large and clear buttons that load corresponding info type.</a:t>
+              <a:t>Large and clear buttons that load corresponding info type.</a:t>
             </a:r>
           </a:p>
           <a:p>
@@ -4584,7 +5541,7 @@
                   <a:schemeClr val="tx1"/>
                 </a:solidFill>
               </a:rPr>
-              <a:t>Priority</a:t>
+              <a:t>M</a:t>
             </a:r>
           </a:p>
         </p:txBody>
@@ -4853,7 +5810,7 @@
                   <a:schemeClr val="tx1"/>
                 </a:solidFill>
               </a:rPr>
-              <a:t>As an exchange student I want to look through the library list so that I can decide which library to click on and look into for further details.</a:t>
+              <a:t>As a university student I want to look through the library list so that I can decide which library to click on and look into for further details.</a:t>
             </a:r>
           </a:p>
         </p:txBody>
@@ -4940,7 +5897,7 @@
                   <a:schemeClr val="tx1"/>
                 </a:solidFill>
               </a:rPr>
-              <a:t>Show the basic info of each library such as location, open hours…etc.</a:t>
+              <a:t>A limited size of box showing the description until it cuts off.</a:t>
             </a:r>
           </a:p>
           <a:p>
@@ -4954,19 +5911,8 @@
                   <a:schemeClr val="tx1"/>
                 </a:solidFill>
               </a:rPr>
-              <a:t>When a certain library is clicked, a new page loads up for the specific library’s info.</a:t>
-            </a:r>
-          </a:p>
-          <a:p>
-            <a:pPr marL="179388" indent="-179388">
-              <a:buFont typeface="Arial" pitchFamily="34" charset="0"/>
-              <a:buChar char="•"/>
-            </a:pPr>
-            <a:endParaRPr lang="en-AU" sz="2000" dirty="0">
-              <a:solidFill>
-                <a:schemeClr val="tx1"/>
-              </a:solidFill>
-            </a:endParaRPr>
+              <a:t>Basic info</a:t>
+            </a:r>
           </a:p>
         </p:txBody>
       </p:sp>
@@ -5084,7 +6030,7 @@
                   <a:schemeClr val="tx1"/>
                 </a:solidFill>
               </a:rPr>
-              <a:t>Priority</a:t>
+              <a:t>S</a:t>
             </a:r>
           </a:p>
         </p:txBody>
@@ -5154,8 +6100,19 @@
                   <a:schemeClr val="tx1"/>
                 </a:solidFill>
               </a:rPr>
-              <a:t> </a:t>
-            </a:r>
+              <a:t> Basic info includes location and open hours</a:t>
+            </a:r>
+          </a:p>
+          <a:p>
+            <a:pPr marL="179388" indent="-179388">
+              <a:buFont typeface="Arial" pitchFamily="34" charset="0"/>
+              <a:buChar char="•"/>
+            </a:pPr>
+            <a:endParaRPr lang="en-AU" sz="2000" dirty="0">
+              <a:solidFill>
+                <a:schemeClr val="tx1"/>
+              </a:solidFill>
+            </a:endParaRPr>
           </a:p>
         </p:txBody>
       </p:sp>
@@ -5353,7 +6310,7 @@
                   <a:schemeClr val="tx1"/>
                 </a:solidFill>
               </a:rPr>
-              <a:t>As an exchange student I want to view each library’s detail and compare so that I can decide which library to go to for my research assessment. </a:t>
+              <a:t>As a university student I want to view each library’s detail and compare so that I can decide which library to go to for my research assessment. </a:t>
             </a:r>
           </a:p>
         </p:txBody>
@@ -5426,7 +6383,7 @@
                   <a:schemeClr val="tx1"/>
                 </a:solidFill>
               </a:rPr>
-              <a:t>Show the library’s full description and some side info such as cafes nearby. </a:t>
+              <a:t>The library’s full description and the basic info </a:t>
             </a:r>
           </a:p>
           <a:p>
@@ -5440,8 +6397,30 @@
                   <a:schemeClr val="tx1"/>
                 </a:solidFill>
               </a:rPr>
-              <a:t>  </a:t>
-            </a:r>
+              <a:t>Cafes nearby </a:t>
+            </a:r>
+          </a:p>
+          <a:p>
+            <a:pPr marL="179388" indent="-179388">
+              <a:buFont typeface="Arial" pitchFamily="34" charset="0"/>
+              <a:buChar char="•"/>
+            </a:pPr>
+            <a:endParaRPr lang="en-AU" sz="2000" dirty="0">
+              <a:solidFill>
+                <a:schemeClr val="tx1"/>
+              </a:solidFill>
+            </a:endParaRPr>
+          </a:p>
+          <a:p>
+            <a:pPr marL="179388" indent="-179388">
+              <a:buFont typeface="Arial" pitchFamily="34" charset="0"/>
+              <a:buChar char="•"/>
+            </a:pPr>
+            <a:endParaRPr lang="en-AU" sz="2000" dirty="0">
+              <a:solidFill>
+                <a:schemeClr val="tx1"/>
+              </a:solidFill>
+            </a:endParaRPr>
           </a:p>
         </p:txBody>
       </p:sp>
@@ -5559,7 +6538,7 @@
                   <a:schemeClr val="tx1"/>
                 </a:solidFill>
               </a:rPr>
-              <a:t>Priority</a:t>
+              <a:t>S</a:t>
             </a:r>
           </a:p>
         </p:txBody>
@@ -5629,8 +6608,19 @@
                   <a:schemeClr val="tx1"/>
                 </a:solidFill>
               </a:rPr>
-              <a:t> </a:t>
-            </a:r>
+              <a:t> Basic info includes location, open hours, nearby public transport…etc.</a:t>
+            </a:r>
+          </a:p>
+          <a:p>
+            <a:pPr marL="179388" indent="-179388">
+              <a:buFont typeface="Arial" pitchFamily="34" charset="0"/>
+              <a:buChar char="•"/>
+            </a:pPr>
+            <a:endParaRPr lang="en-AU" sz="2000" dirty="0">
+              <a:solidFill>
+                <a:schemeClr val="tx1"/>
+              </a:solidFill>
+            </a:endParaRPr>
           </a:p>
         </p:txBody>
       </p:sp>
@@ -5714,7 +6704,7 @@
                   <a:schemeClr val="tx1"/>
                 </a:solidFill>
               </a:rPr>
-              <a:t>Story ID 0</a:t>
+              <a:t>Story ID 1</a:t>
             </a:r>
           </a:p>
         </p:txBody>
@@ -5764,7 +6754,7 @@
             <a:pPr algn="ctr"/>
             <a:r>
               <a:rPr lang="en-AU" sz="2800" dirty="0"/>
-              <a:t>Logout</a:t>
+              <a:t>University list page</a:t>
             </a:r>
           </a:p>
         </p:txBody>
@@ -5823,7 +6813,7 @@
                   <a:schemeClr val="tx1"/>
                 </a:solidFill>
               </a:rPr>
-              <a:t>As a … I want … so that …</a:t>
+              <a:t>As an exchange student I want to look through the university list so that I can decide which university to click on and look into for further details.</a:t>
             </a:r>
           </a:p>
         </p:txBody>
@@ -5884,6 +6874,59 @@
               </a:rPr>
               <a:t>Acceptance Criteria</a:t>
             </a:r>
+          </a:p>
+          <a:p>
+            <a:pPr marL="179388" indent="-179388">
+              <a:buFont typeface="Arial" pitchFamily="34" charset="0"/>
+              <a:buChar char="•"/>
+            </a:pPr>
+            <a:r>
+              <a:rPr lang="en-AU" sz="2000" dirty="0">
+                <a:solidFill>
+                  <a:schemeClr val="tx1"/>
+                </a:solidFill>
+              </a:rPr>
+              <a:t>Set the major universities on the top of the library page as default</a:t>
+            </a:r>
+          </a:p>
+          <a:p>
+            <a:pPr marL="179388" indent="-179388">
+              <a:buFont typeface="Arial" pitchFamily="34" charset="0"/>
+              <a:buChar char="•"/>
+            </a:pPr>
+            <a:r>
+              <a:rPr lang="en-AU" sz="2000" dirty="0">
+                <a:solidFill>
+                  <a:schemeClr val="tx1"/>
+                </a:solidFill>
+              </a:rPr>
+              <a:t>A limited size of box showing the description until it cuts off.</a:t>
+            </a:r>
+          </a:p>
+          <a:p>
+            <a:pPr marL="179388" indent="-179388">
+              <a:buFont typeface="Arial" pitchFamily="34" charset="0"/>
+              <a:buChar char="•"/>
+            </a:pPr>
+            <a:r>
+              <a:rPr lang="en-AU" sz="2000" dirty="0">
+                <a:solidFill>
+                  <a:schemeClr val="tx1"/>
+                </a:solidFill>
+              </a:rPr>
+              <a:t>Basic info</a:t>
+            </a:r>
+          </a:p>
+          <a:p>
+            <a:pPr marL="179388" indent="-179388">
+              <a:buFont typeface="Arial" pitchFamily="34" charset="0"/>
+              <a:buChar char="•"/>
+            </a:pPr>
+            <a:endParaRPr lang="en-AU" sz="2000" dirty="0">
+              <a:solidFill>
+                <a:schemeClr val="tx1"/>
+              </a:solidFill>
+            </a:endParaRPr>
           </a:p>
           <a:p>
             <a:pPr marL="179388" indent="-179388">
@@ -6012,7 +7055,7 @@
                   <a:schemeClr val="tx1"/>
                 </a:solidFill>
               </a:rPr>
-              <a:t>Priority</a:t>
+              <a:t>S</a:t>
             </a:r>
           </a:p>
         </p:txBody>
@@ -6082,15 +7125,26 @@
                   <a:schemeClr val="tx1"/>
                 </a:solidFill>
               </a:rPr>
-              <a:t> </a:t>
-            </a:r>
+              <a:t> Basic info includes location of each campus</a:t>
+            </a:r>
+          </a:p>
+          <a:p>
+            <a:pPr marL="179388" indent="-179388">
+              <a:buFont typeface="Arial" pitchFamily="34" charset="0"/>
+              <a:buChar char="•"/>
+            </a:pPr>
+            <a:endParaRPr lang="en-AU" sz="2000" dirty="0">
+              <a:solidFill>
+                <a:schemeClr val="tx1"/>
+              </a:solidFill>
+            </a:endParaRPr>
           </a:p>
         </p:txBody>
       </p:sp>
     </p:spTree>
     <p:extLst>
       <p:ext uri="{BB962C8B-B14F-4D97-AF65-F5344CB8AC3E}">
-        <p14:creationId xmlns:p14="http://schemas.microsoft.com/office/powerpoint/2010/main" val="4293085438"/>
+        <p14:creationId xmlns:p14="http://schemas.microsoft.com/office/powerpoint/2010/main" val="3631949427"/>
       </p:ext>
     </p:extLst>
   </p:cSld>
@@ -6172,7 +7226,7 @@
                   <a:schemeClr val="tx1"/>
                 </a:solidFill>
               </a:rPr>
-              <a:t>Story ID 2 </a:t>
+              <a:t>Story ID 1</a:t>
             </a:r>
           </a:p>
         </p:txBody>
@@ -6222,7 +7276,7 @@
             <a:pPr algn="ctr"/>
             <a:r>
               <a:rPr lang="en-AU" sz="2800" dirty="0"/>
-              <a:t>Story Title</a:t>
+              <a:t>Individual university’s page</a:t>
             </a:r>
           </a:p>
         </p:txBody>
@@ -6281,7 +7335,7 @@
                   <a:schemeClr val="tx1"/>
                 </a:solidFill>
               </a:rPr>
-              <a:t>As a tourist I want to know the hotels’ price, accommodation and facility so that I can compare to other hotels.</a:t>
+              <a:t>As a university student I want to view each university’s detail and compare so that I can find upcoming events and clubs that interest me.</a:t>
             </a:r>
           </a:p>
         </p:txBody>
@@ -6354,8 +7408,72 @@
                   <a:schemeClr val="tx1"/>
                 </a:solidFill>
               </a:rPr>
-              <a:t> The hotel page can sort the hotel list in price order, and has accommodation images and facility checkboxes under each hotel.</a:t>
-            </a:r>
+              <a:t>The library’s full description and the basic info</a:t>
+            </a:r>
+          </a:p>
+          <a:p>
+            <a:pPr marL="179388" indent="-179388">
+              <a:buFont typeface="Arial" pitchFamily="34" charset="0"/>
+              <a:buChar char="•"/>
+            </a:pPr>
+            <a:r>
+              <a:rPr lang="en-AU" sz="2000" dirty="0">
+                <a:solidFill>
+                  <a:schemeClr val="tx1"/>
+                </a:solidFill>
+              </a:rPr>
+              <a:t>Upcoming events </a:t>
+            </a:r>
+          </a:p>
+          <a:p>
+            <a:pPr marL="179388" indent="-179388">
+              <a:buFont typeface="Arial" pitchFamily="34" charset="0"/>
+              <a:buChar char="•"/>
+            </a:pPr>
+            <a:r>
+              <a:rPr lang="en-AU" sz="2000" dirty="0">
+                <a:solidFill>
+                  <a:schemeClr val="tx1"/>
+                </a:solidFill>
+              </a:rPr>
+              <a:t>University clubs</a:t>
+            </a:r>
+          </a:p>
+          <a:p>
+            <a:pPr marL="179388" indent="-179388">
+              <a:buFont typeface="Arial" pitchFamily="34" charset="0"/>
+              <a:buChar char="•"/>
+            </a:pPr>
+            <a:r>
+              <a:rPr lang="en-AU" sz="2000" dirty="0">
+                <a:solidFill>
+                  <a:schemeClr val="tx1"/>
+                </a:solidFill>
+              </a:rPr>
+              <a:t>Basic info</a:t>
+            </a:r>
+          </a:p>
+          <a:p>
+            <a:pPr marL="179388" indent="-179388">
+              <a:buFont typeface="Arial" pitchFamily="34" charset="0"/>
+              <a:buChar char="•"/>
+            </a:pPr>
+            <a:endParaRPr lang="en-AU" sz="2000" dirty="0">
+              <a:solidFill>
+                <a:schemeClr val="tx1"/>
+              </a:solidFill>
+            </a:endParaRPr>
+          </a:p>
+          <a:p>
+            <a:pPr marL="179388" indent="-179388">
+              <a:buFont typeface="Arial" pitchFamily="34" charset="0"/>
+              <a:buChar char="•"/>
+            </a:pPr>
+            <a:endParaRPr lang="en-AU" sz="2000" dirty="0">
+              <a:solidFill>
+                <a:schemeClr val="tx1"/>
+              </a:solidFill>
+            </a:endParaRPr>
           </a:p>
         </p:txBody>
       </p:sp>
@@ -6473,7 +7591,7 @@
                   <a:schemeClr val="tx1"/>
                 </a:solidFill>
               </a:rPr>
-              <a:t>Priority</a:t>
+              <a:t>S</a:t>
             </a:r>
           </a:p>
         </p:txBody>
@@ -6543,15 +7661,42 @@
                   <a:schemeClr val="tx1"/>
                 </a:solidFill>
               </a:rPr>
-              <a:t> </a:t>
-            </a:r>
+              <a:t>Basic info includes location of each campus</a:t>
+            </a:r>
+            <a:r>
+              <a:rPr lang="en-AU" sz="2000">
+                <a:solidFill>
+                  <a:schemeClr val="tx1"/>
+                </a:solidFill>
+              </a:rPr>
+              <a:t>, their map </a:t>
+            </a:r>
+            <a:r>
+              <a:rPr lang="en-AU" sz="2000" dirty="0">
+                <a:solidFill>
+                  <a:schemeClr val="tx1"/>
+                </a:solidFill>
+              </a:rPr>
+              <a:t>and their nearby public transport</a:t>
+            </a:r>
+          </a:p>
+          <a:p>
+            <a:pPr marL="179388" indent="-179388">
+              <a:buFont typeface="Arial" pitchFamily="34" charset="0"/>
+              <a:buChar char="•"/>
+            </a:pPr>
+            <a:endParaRPr lang="en-AU" sz="2000" dirty="0">
+              <a:solidFill>
+                <a:schemeClr val="tx1"/>
+              </a:solidFill>
+            </a:endParaRPr>
           </a:p>
         </p:txBody>
       </p:sp>
     </p:spTree>
     <p:extLst>
       <p:ext uri="{BB962C8B-B14F-4D97-AF65-F5344CB8AC3E}">
-        <p14:creationId xmlns:p14="http://schemas.microsoft.com/office/powerpoint/2010/main" val="367885913"/>
+        <p14:creationId xmlns:p14="http://schemas.microsoft.com/office/powerpoint/2010/main" val="2492316392"/>
       </p:ext>
     </p:extLst>
   </p:cSld>
@@ -6633,7 +7778,7 @@
                   <a:schemeClr val="tx1"/>
                 </a:solidFill>
               </a:rPr>
-              <a:t>Story ID 3</a:t>
+              <a:t>Story ID 0</a:t>
             </a:r>
           </a:p>
         </p:txBody>
@@ -6683,7 +7828,7 @@
             <a:pPr algn="ctr"/>
             <a:r>
               <a:rPr lang="en-AU" sz="2800" dirty="0"/>
-              <a:t>Story Title</a:t>
+              <a:t>Logout</a:t>
             </a:r>
           </a:p>
         </p:txBody>
@@ -6742,7 +7887,7 @@
                   <a:schemeClr val="tx1"/>
                 </a:solidFill>
               </a:rPr>
-              <a:t>As a businessman I want to know what industries and companies there are in the city so that I can decide on who to contact and sell my products.</a:t>
+              <a:t>As a … I want … so that …</a:t>
             </a:r>
           </a:p>
         </p:txBody>
@@ -6809,22 +7954,6 @@
               <a:buFont typeface="Arial" pitchFamily="34" charset="0"/>
               <a:buChar char="•"/>
             </a:pPr>
-            <a:r>
-              <a:rPr lang="en-AU" sz="2000" dirty="0">
-                <a:solidFill>
-                  <a:schemeClr val="tx1"/>
-                </a:solidFill>
-              </a:rPr>
-              <a:t> The industries page has a combo box to choose the category of industries </a:t>
-            </a:r>
-            <a:r>
-              <a:rPr lang="en-AU" sz="2000">
-                <a:solidFill>
-                  <a:schemeClr val="tx1"/>
-                </a:solidFill>
-              </a:rPr>
-              <a:t>to display. </a:t>
-            </a:r>
             <a:endParaRPr lang="en-AU" sz="2000" dirty="0">
               <a:solidFill>
                 <a:schemeClr val="tx1"/>
@@ -7025,7 +8154,7 @@
     </p:spTree>
     <p:extLst>
       <p:ext uri="{BB962C8B-B14F-4D97-AF65-F5344CB8AC3E}">
-        <p14:creationId xmlns:p14="http://schemas.microsoft.com/office/powerpoint/2010/main" val="4032204815"/>
+        <p14:creationId xmlns:p14="http://schemas.microsoft.com/office/powerpoint/2010/main" val="4293085438"/>
       </p:ext>
     </p:extLst>
   </p:cSld>

</xml_diff>